<commit_message>
update readme and presentations
</commit_message>
<xml_diff>
--- a/course_data/presentations/practical_spring_boot_for_tdp_01.pptx
+++ b/course_data/presentations/practical_spring_boot_for_tdp_01.pptx
@@ -246,7 +246,7 @@
           <a:p>
             <a:fld id="{AD4DB1D7-A2E6-5540-AAB6-9A95390687AC}" type="datetimeFigureOut">
               <a:rPr lang="en-IL" smtClean="0"/>
-              <a:t>21/07/2024</a:t>
+              <a:t>22/07/2024</a:t>
             </a:fld>
             <a:endParaRPr lang="en-IL"/>
           </a:p>
@@ -1953,7 +1953,7 @@
             <a:fld id="{B61BEF0D-F0BB-DE4B-95CE-6DB70DBA9567}" type="datetimeFigureOut">
               <a:rPr lang="en-US" dirty="0"/>
               <a:pPr/>
-              <a:t>7/21/24</a:t>
+              <a:t>7/22/24</a:t>
             </a:fld>
             <a:endParaRPr lang="en-US" dirty="0"/>
           </a:p>
@@ -2201,7 +2201,7 @@
             <a:fld id="{B61BEF0D-F0BB-DE4B-95CE-6DB70DBA9567}" type="datetimeFigureOut">
               <a:rPr lang="en-US" dirty="0"/>
               <a:pPr/>
-              <a:t>7/21/24</a:t>
+              <a:t>7/22/24</a:t>
             </a:fld>
             <a:endParaRPr lang="en-US" dirty="0"/>
           </a:p>
@@ -2512,7 +2512,7 @@
             <a:fld id="{B61BEF0D-F0BB-DE4B-95CE-6DB70DBA9567}" type="datetimeFigureOut">
               <a:rPr lang="en-US" dirty="0"/>
               <a:pPr/>
-              <a:t>7/21/24</a:t>
+              <a:t>7/22/24</a:t>
             </a:fld>
             <a:endParaRPr lang="en-US" dirty="0"/>
           </a:p>
@@ -2850,7 +2850,7 @@
             <a:fld id="{B61BEF0D-F0BB-DE4B-95CE-6DB70DBA9567}" type="datetimeFigureOut">
               <a:rPr lang="en-US" dirty="0"/>
               <a:pPr/>
-              <a:t>7/21/24</a:t>
+              <a:t>7/22/24</a:t>
             </a:fld>
             <a:endParaRPr lang="en-US" dirty="0"/>
           </a:p>
@@ -3161,7 +3161,7 @@
             <a:fld id="{B61BEF0D-F0BB-DE4B-95CE-6DB70DBA9567}" type="datetimeFigureOut">
               <a:rPr lang="en-US" dirty="0"/>
               <a:pPr/>
-              <a:t>7/21/24</a:t>
+              <a:t>7/22/24</a:t>
             </a:fld>
             <a:endParaRPr lang="en-US" dirty="0"/>
           </a:p>
@@ -3551,7 +3551,7 @@
             <a:fld id="{B61BEF0D-F0BB-DE4B-95CE-6DB70DBA9567}" type="datetimeFigureOut">
               <a:rPr lang="en-US" dirty="0"/>
               <a:pPr/>
-              <a:t>7/21/24</a:t>
+              <a:t>7/22/24</a:t>
             </a:fld>
             <a:endParaRPr lang="en-US" dirty="0"/>
           </a:p>
@@ -3717,7 +3717,7 @@
           <a:p>
             <a:fld id="{55C6B4A9-1611-4792-9094-5F34BCA07E0B}" type="datetimeFigureOut">
               <a:rPr lang="en-US" dirty="0"/>
-              <a:t>7/21/24</a:t>
+              <a:t>7/22/24</a:t>
             </a:fld>
             <a:endParaRPr lang="en-US" dirty="0"/>
           </a:p>
@@ -3893,7 +3893,7 @@
             <a:fld id="{B61BEF0D-F0BB-DE4B-95CE-6DB70DBA9567}" type="datetimeFigureOut">
               <a:rPr lang="en-US" dirty="0"/>
               <a:pPr/>
-              <a:t>7/21/24</a:t>
+              <a:t>7/22/24</a:t>
             </a:fld>
             <a:endParaRPr lang="en-US" dirty="0"/>
           </a:p>
@@ -4075,7 +4075,7 @@
             <a:fld id="{B61BEF0D-F0BB-DE4B-95CE-6DB70DBA9567}" type="datetimeFigureOut">
               <a:rPr lang="en-US" dirty="0"/>
               <a:pPr/>
-              <a:t>7/21/24</a:t>
+              <a:t>7/22/24</a:t>
             </a:fld>
             <a:endParaRPr lang="en-US" dirty="0"/>
           </a:p>
@@ -4335,7 +4335,7 @@
             <a:fld id="{B61BEF0D-F0BB-DE4B-95CE-6DB70DBA9567}" type="datetimeFigureOut">
               <a:rPr lang="en-US" dirty="0"/>
               <a:pPr/>
-              <a:t>7/21/24</a:t>
+              <a:t>7/22/24</a:t>
             </a:fld>
             <a:endParaRPr lang="en-US" dirty="0"/>
           </a:p>
@@ -4563,7 +4563,7 @@
           <a:p>
             <a:fld id="{EB712588-04B1-427B-82EE-E8DB90309F08}" type="datetimeFigureOut">
               <a:rPr lang="en-US" dirty="0"/>
-              <a:t>7/21/24</a:t>
+              <a:t>7/22/24</a:t>
             </a:fld>
             <a:endParaRPr lang="en-US" dirty="0"/>
           </a:p>
@@ -4933,7 +4933,7 @@
             <a:fld id="{B61BEF0D-F0BB-DE4B-95CE-6DB70DBA9567}" type="datetimeFigureOut">
               <a:rPr lang="en-US" dirty="0"/>
               <a:pPr/>
-              <a:t>7/21/24</a:t>
+              <a:t>7/22/24</a:t>
             </a:fld>
             <a:endParaRPr lang="en-US" dirty="0"/>
           </a:p>
@@ -5053,7 +5053,7 @@
             <a:fld id="{B61BEF0D-F0BB-DE4B-95CE-6DB70DBA9567}" type="datetimeFigureOut">
               <a:rPr lang="en-US" dirty="0"/>
               <a:pPr/>
-              <a:t>7/21/24</a:t>
+              <a:t>7/22/24</a:t>
             </a:fld>
             <a:endParaRPr lang="en-US" dirty="0"/>
           </a:p>
@@ -5145,7 +5145,7 @@
             <a:fld id="{B61BEF0D-F0BB-DE4B-95CE-6DB70DBA9567}" type="datetimeFigureOut">
               <a:rPr lang="en-US" dirty="0"/>
               <a:pPr/>
-              <a:t>7/21/24</a:t>
+              <a:t>7/22/24</a:t>
             </a:fld>
             <a:endParaRPr lang="en-US" dirty="0"/>
           </a:p>
@@ -5396,7 +5396,7 @@
           <a:p>
             <a:fld id="{42A54C80-263E-416B-A8E0-580EDEADCBDC}" type="datetimeFigureOut">
               <a:rPr lang="en-US" dirty="0"/>
-              <a:t>7/21/24</a:t>
+              <a:t>7/22/24</a:t>
             </a:fld>
             <a:endParaRPr lang="en-US" dirty="0"/>
           </a:p>
@@ -5655,7 +5655,7 @@
             <a:fld id="{B61BEF0D-F0BB-DE4B-95CE-6DB70DBA9567}" type="datetimeFigureOut">
               <a:rPr lang="en-US" dirty="0"/>
               <a:pPr/>
-              <a:t>7/21/24</a:t>
+              <a:t>7/22/24</a:t>
             </a:fld>
             <a:endParaRPr lang="en-US" dirty="0"/>
           </a:p>
@@ -6395,7 +6395,7 @@
             <a:fld id="{B61BEF0D-F0BB-DE4B-95CE-6DB70DBA9567}" type="datetimeFigureOut">
               <a:rPr lang="en-US" dirty="0"/>
               <a:pPr/>
-              <a:t>7/21/24</a:t>
+              <a:t>7/22/24</a:t>
             </a:fld>
             <a:endParaRPr lang="en-US" dirty="0"/>
           </a:p>
@@ -26576,6 +26576,15 @@
 </file>
 
 <file path=customXml/item1.xml><?xml version="1.0" encoding="utf-8"?>
+<?mso-contentType ?>
+<FormTemplates xmlns="http://schemas.microsoft.com/sharepoint/v3/contenttype/forms">
+  <Display>DocumentLibraryForm</Display>
+  <Edit>DocumentLibraryForm</Edit>
+  <New>DocumentLibraryForm</New>
+</FormTemplates>
+</file>
+
+<file path=customXml/item2.xml><?xml version="1.0" encoding="utf-8"?>
 <p:properties xmlns:p="http://schemas.microsoft.com/office/2006/metadata/properties" xmlns:xsi="http://www.w3.org/2001/XMLSchema-instance" xmlns:pc="http://schemas.microsoft.com/office/infopath/2007/PartnerControls">
   <documentManagement>
     <lcf76f155ced4ddcb4097134ff3c332f xmlns="858d5390-0f7b-4213-8bcd-0cd5cf778ba6">
@@ -26584,15 +26593,6 @@
     <TaxCatchAll xmlns="e5f39eeb-dc9c-40bf-a733-e74d7baf73b9" xsi:nil="true"/>
   </documentManagement>
 </p:properties>
-</file>
-
-<file path=customXml/item2.xml><?xml version="1.0" encoding="utf-8"?>
-<?mso-contentType ?>
-<FormTemplates xmlns="http://schemas.microsoft.com/sharepoint/v3/contenttype/forms">
-  <Display>DocumentLibraryForm</Display>
-  <Edit>DocumentLibraryForm</Edit>
-  <New>DocumentLibraryForm</New>
-</FormTemplates>
 </file>
 
 <file path=customXml/item3.xml><?xml version="1.0" encoding="utf-8"?>
@@ -26844,20 +26844,20 @@
 </file>
 
 <file path=customXml/itemProps1.xml><?xml version="1.0" encoding="utf-8"?>
+<ds:datastoreItem xmlns:ds="http://schemas.openxmlformats.org/officeDocument/2006/customXml" ds:itemID="{CAAF7FB3-E9ED-4EED-B8B3-D582CBAD96FA}">
+  <ds:schemaRefs>
+    <ds:schemaRef ds:uri="http://schemas.microsoft.com/sharepoint/v3/contenttype/forms"/>
+  </ds:schemaRefs>
+</ds:datastoreItem>
+</file>
+
+<file path=customXml/itemProps2.xml><?xml version="1.0" encoding="utf-8"?>
 <ds:datastoreItem xmlns:ds="http://schemas.openxmlformats.org/officeDocument/2006/customXml" ds:itemID="{2B532926-D782-41F9-BAB4-3CFD211C0FE2}">
   <ds:schemaRefs>
     <ds:schemaRef ds:uri="http://schemas.microsoft.com/office/2006/metadata/properties"/>
     <ds:schemaRef ds:uri="http://schemas.microsoft.com/office/infopath/2007/PartnerControls"/>
     <ds:schemaRef ds:uri="858d5390-0f7b-4213-8bcd-0cd5cf778ba6"/>
     <ds:schemaRef ds:uri="e5f39eeb-dc9c-40bf-a733-e74d7baf73b9"/>
-  </ds:schemaRefs>
-</ds:datastoreItem>
-</file>
-
-<file path=customXml/itemProps2.xml><?xml version="1.0" encoding="utf-8"?>
-<ds:datastoreItem xmlns:ds="http://schemas.openxmlformats.org/officeDocument/2006/customXml" ds:itemID="{CAAF7FB3-E9ED-4EED-B8B3-D582CBAD96FA}">
-  <ds:schemaRefs>
-    <ds:schemaRef ds:uri="http://schemas.microsoft.com/sharepoint/v3/contenttype/forms"/>
   </ds:schemaRefs>
 </ds:datastoreItem>
 </file>

</xml_diff>